<commit_message>
Added Surat DATA and made structureed
</commit_message>
<xml_diff>
--- a/Research/Docs/SIH2025_PPT.pptx
+++ b/Research/Docs/SIH2025_PPT.pptx
@@ -261,7 +261,7 @@
             <a:fld id="{C4D5ADD5-2BBC-4A94-8F86-D9013941F742}" type="datetimeFigureOut">
               <a:rPr lang="en-US"/>
               <a:pPr/>
-              <a:t>9/9/2025</a:t>
+              <a:t>10-Sep-25</a:t>
             </a:fld>
             <a:endParaRPr lang="en-US"/>
           </a:p>
@@ -1534,7 +1534,7 @@
           <a:p>
             <a:fld id="{E60792E3-D524-454C-8AFD-A91972900BCB}" type="datetime1">
               <a:rPr lang="en-US" smtClean="0"/>
-              <a:t>9/9/2025</a:t>
+              <a:t>10-Sep-25</a:t>
             </a:fld>
             <a:endParaRPr lang="en-US"/>
           </a:p>
@@ -1719,7 +1719,7 @@
           <a:p>
             <a:fld id="{053C3A68-6922-42D3-8905-ECC2D82A3469}" type="datetime1">
               <a:rPr lang="en-US" smtClean="0"/>
-              <a:t>9/9/2025</a:t>
+              <a:t>10-Sep-25</a:t>
             </a:fld>
             <a:endParaRPr lang="en-US"/>
           </a:p>
@@ -1914,7 +1914,7 @@
           <a:p>
             <a:fld id="{CB69E9F4-7604-4950-A8B2-8ACDEDB1506E}" type="datetime1">
               <a:rPr lang="en-US" smtClean="0"/>
-              <a:t>9/9/2025</a:t>
+              <a:t>10-Sep-25</a:t>
             </a:fld>
             <a:endParaRPr lang="en-US"/>
           </a:p>
@@ -2099,7 +2099,7 @@
           <a:p>
             <a:fld id="{708B7524-32A2-4C20-A58C-BC3BAA1042FC}" type="datetime1">
               <a:rPr lang="en-US" smtClean="0"/>
-              <a:t>9/9/2025</a:t>
+              <a:t>10-Sep-25</a:t>
             </a:fld>
             <a:endParaRPr lang="en-US"/>
           </a:p>
@@ -2361,7 +2361,7 @@
           <a:p>
             <a:fld id="{1E994447-D6B2-43BB-A877-57F1A267B999}" type="datetime1">
               <a:rPr lang="en-US" smtClean="0"/>
-              <a:t>9/9/2025</a:t>
+              <a:t>10-Sep-25</a:t>
             </a:fld>
             <a:endParaRPr lang="en-US"/>
           </a:p>
@@ -2663,7 +2663,7 @@
           <a:p>
             <a:fld id="{68920E16-BD35-483C-AA6B-346FC7E46DEA}" type="datetime1">
               <a:rPr lang="en-US" smtClean="0"/>
-              <a:t>9/9/2025</a:t>
+              <a:t>10-Sep-25</a:t>
             </a:fld>
             <a:endParaRPr lang="en-US"/>
           </a:p>
@@ -3099,7 +3099,7 @@
           <a:p>
             <a:fld id="{2FEAC6F8-5103-4FC0-A69E-5C6AE6469DA8}" type="datetime1">
               <a:rPr lang="en-US" smtClean="0"/>
-              <a:t>9/9/2025</a:t>
+              <a:t>10-Sep-25</a:t>
             </a:fld>
             <a:endParaRPr lang="en-US"/>
           </a:p>
@@ -3233,7 +3233,7 @@
           <a:p>
             <a:fld id="{C60C6921-0627-4C8F-83D5-0CF936D2FFDD}" type="datetime1">
               <a:rPr lang="en-US" smtClean="0"/>
-              <a:t>9/9/2025</a:t>
+              <a:t>10-Sep-25</a:t>
             </a:fld>
             <a:endParaRPr lang="en-US"/>
           </a:p>
@@ -3345,7 +3345,7 @@
           <a:p>
             <a:fld id="{2FF08AD7-8103-40F8-983C-E2BA6BB9CBE0}" type="datetime1">
               <a:rPr lang="en-US" smtClean="0"/>
-              <a:t>9/9/2025</a:t>
+              <a:t>10-Sep-25</a:t>
             </a:fld>
             <a:endParaRPr lang="en-US"/>
           </a:p>
@@ -3637,7 +3637,7 @@
           <a:p>
             <a:fld id="{DF8C06B4-9380-4A4D-AF49-A3596E17DAF5}" type="datetime1">
               <a:rPr lang="en-US" smtClean="0"/>
-              <a:t>9/9/2025</a:t>
+              <a:t>10-Sep-25</a:t>
             </a:fld>
             <a:endParaRPr lang="en-US"/>
           </a:p>
@@ -3909,7 +3909,7 @@
           <a:p>
             <a:fld id="{EF7FDEF1-C582-4E22-9E77-D68326471F28}" type="datetime1">
               <a:rPr lang="en-US" smtClean="0"/>
-              <a:t>9/9/2025</a:t>
+              <a:t>10-Sep-25</a:t>
             </a:fld>
             <a:endParaRPr lang="en-US"/>
           </a:p>
@@ -4155,7 +4155,7 @@
           <a:p>
             <a:fld id="{780A9602-A9A9-453F-AEF1-37B5837E02CD}" type="datetime1">
               <a:rPr lang="en-US" smtClean="0"/>
-              <a:t>9/9/2025</a:t>
+              <a:t>10-Sep-25</a:t>
             </a:fld>
             <a:endParaRPr lang="en-US"/>
           </a:p>
@@ -7917,6 +7917,108 @@
           </a:p>
         </p:txBody>
       </p:sp>
+      <p:sp>
+        <p:nvSpPr>
+          <p:cNvPr id="2" name="Rectangle 1">
+            <a:extLst>
+              <a:ext uri="{FF2B5EF4-FFF2-40B4-BE49-F238E27FC236}">
+                <a16:creationId xmlns:a16="http://schemas.microsoft.com/office/drawing/2014/main" id="{E29E3805-DC4C-5B11-A95E-AB8EA2E96E1F}"/>
+              </a:ext>
+            </a:extLst>
+          </p:cNvPr>
+          <p:cNvSpPr/>
+          <p:nvPr/>
+        </p:nvSpPr>
+        <p:spPr>
+          <a:xfrm>
+            <a:off x="11075670" y="3432810"/>
+            <a:ext cx="304800" cy="131445"/>
+          </a:xfrm>
+          <a:prstGeom prst="rect">
+            <a:avLst/>
+          </a:prstGeom>
+          <a:solidFill>
+            <a:srgbClr val="E3F2FD"/>
+          </a:solidFill>
+          <a:ln>
+            <a:noFill/>
+          </a:ln>
+          <a:effectLst/>
+        </p:spPr>
+        <p:style>
+          <a:lnRef idx="1">
+            <a:schemeClr val="accent1"/>
+          </a:lnRef>
+          <a:fillRef idx="3">
+            <a:schemeClr val="accent1"/>
+          </a:fillRef>
+          <a:effectRef idx="2">
+            <a:schemeClr val="accent1"/>
+          </a:effectRef>
+          <a:fontRef idx="minor">
+            <a:schemeClr val="lt1"/>
+          </a:fontRef>
+        </p:style>
+        <p:txBody>
+          <a:bodyPr rtlCol="0" anchor="ctr"/>
+          <a:lstStyle/>
+          <a:p>
+            <a:pPr algn="ctr"/>
+            <a:endParaRPr lang="en-IN"/>
+          </a:p>
+        </p:txBody>
+      </p:sp>
+      <p:sp>
+        <p:nvSpPr>
+          <p:cNvPr id="6" name="Rectangle 5">
+            <a:extLst>
+              <a:ext uri="{FF2B5EF4-FFF2-40B4-BE49-F238E27FC236}">
+                <a16:creationId xmlns:a16="http://schemas.microsoft.com/office/drawing/2014/main" id="{1B500D5E-4A7B-4B8A-B537-19FCF46BBA74}"/>
+              </a:ext>
+            </a:extLst>
+          </p:cNvPr>
+          <p:cNvSpPr/>
+          <p:nvPr/>
+        </p:nvSpPr>
+        <p:spPr>
+          <a:xfrm>
+            <a:off x="11075670" y="3635072"/>
+            <a:ext cx="304800" cy="112063"/>
+          </a:xfrm>
+          <a:prstGeom prst="rect">
+            <a:avLst/>
+          </a:prstGeom>
+          <a:solidFill>
+            <a:srgbClr val="E3F2FD"/>
+          </a:solidFill>
+          <a:ln>
+            <a:noFill/>
+          </a:ln>
+          <a:effectLst/>
+        </p:spPr>
+        <p:style>
+          <a:lnRef idx="1">
+            <a:schemeClr val="accent1"/>
+          </a:lnRef>
+          <a:fillRef idx="3">
+            <a:schemeClr val="accent1"/>
+          </a:fillRef>
+          <a:effectRef idx="2">
+            <a:schemeClr val="accent1"/>
+          </a:effectRef>
+          <a:fontRef idx="minor">
+            <a:schemeClr val="lt1"/>
+          </a:fontRef>
+        </p:style>
+        <p:txBody>
+          <a:bodyPr rtlCol="0" anchor="ctr"/>
+          <a:lstStyle/>
+          <a:p>
+            <a:pPr algn="ctr"/>
+            <a:endParaRPr lang="en-IN"/>
+          </a:p>
+        </p:txBody>
+      </p:sp>
     </p:spTree>
   </p:cSld>
   <p:clrMapOvr>

</xml_diff>

<commit_message>
Clear cluttered and fixed PPt
</commit_message>
<xml_diff>
--- a/Research/Docs/SIH2025_PPT.pptx
+++ b/Research/Docs/SIH2025_PPT.pptx
@@ -261,7 +261,7 @@
             <a:fld id="{C4D5ADD5-2BBC-4A94-8F86-D9013941F742}" type="datetimeFigureOut">
               <a:rPr lang="en-US"/>
               <a:pPr/>
-              <a:t>10-Sep-25</a:t>
+              <a:t>23-Sep-25</a:t>
             </a:fld>
             <a:endParaRPr lang="en-US"/>
           </a:p>
@@ -1534,7 +1534,7 @@
           <a:p>
             <a:fld id="{E60792E3-D524-454C-8AFD-A91972900BCB}" type="datetime1">
               <a:rPr lang="en-US" smtClean="0"/>
-              <a:t>10-Sep-25</a:t>
+              <a:t>23-Sep-25</a:t>
             </a:fld>
             <a:endParaRPr lang="en-US"/>
           </a:p>
@@ -1719,7 +1719,7 @@
           <a:p>
             <a:fld id="{053C3A68-6922-42D3-8905-ECC2D82A3469}" type="datetime1">
               <a:rPr lang="en-US" smtClean="0"/>
-              <a:t>10-Sep-25</a:t>
+              <a:t>23-Sep-25</a:t>
             </a:fld>
             <a:endParaRPr lang="en-US"/>
           </a:p>
@@ -1914,7 +1914,7 @@
           <a:p>
             <a:fld id="{CB69E9F4-7604-4950-A8B2-8ACDEDB1506E}" type="datetime1">
               <a:rPr lang="en-US" smtClean="0"/>
-              <a:t>10-Sep-25</a:t>
+              <a:t>23-Sep-25</a:t>
             </a:fld>
             <a:endParaRPr lang="en-US"/>
           </a:p>
@@ -2099,7 +2099,7 @@
           <a:p>
             <a:fld id="{708B7524-32A2-4C20-A58C-BC3BAA1042FC}" type="datetime1">
               <a:rPr lang="en-US" smtClean="0"/>
-              <a:t>10-Sep-25</a:t>
+              <a:t>23-Sep-25</a:t>
             </a:fld>
             <a:endParaRPr lang="en-US"/>
           </a:p>
@@ -2361,7 +2361,7 @@
           <a:p>
             <a:fld id="{1E994447-D6B2-43BB-A877-57F1A267B999}" type="datetime1">
               <a:rPr lang="en-US" smtClean="0"/>
-              <a:t>10-Sep-25</a:t>
+              <a:t>23-Sep-25</a:t>
             </a:fld>
             <a:endParaRPr lang="en-US"/>
           </a:p>
@@ -2663,7 +2663,7 @@
           <a:p>
             <a:fld id="{68920E16-BD35-483C-AA6B-346FC7E46DEA}" type="datetime1">
               <a:rPr lang="en-US" smtClean="0"/>
-              <a:t>10-Sep-25</a:t>
+              <a:t>23-Sep-25</a:t>
             </a:fld>
             <a:endParaRPr lang="en-US"/>
           </a:p>
@@ -3099,7 +3099,7 @@
           <a:p>
             <a:fld id="{2FEAC6F8-5103-4FC0-A69E-5C6AE6469DA8}" type="datetime1">
               <a:rPr lang="en-US" smtClean="0"/>
-              <a:t>10-Sep-25</a:t>
+              <a:t>23-Sep-25</a:t>
             </a:fld>
             <a:endParaRPr lang="en-US"/>
           </a:p>
@@ -3233,7 +3233,7 @@
           <a:p>
             <a:fld id="{C60C6921-0627-4C8F-83D5-0CF936D2FFDD}" type="datetime1">
               <a:rPr lang="en-US" smtClean="0"/>
-              <a:t>10-Sep-25</a:t>
+              <a:t>23-Sep-25</a:t>
             </a:fld>
             <a:endParaRPr lang="en-US"/>
           </a:p>
@@ -3345,7 +3345,7 @@
           <a:p>
             <a:fld id="{2FF08AD7-8103-40F8-983C-E2BA6BB9CBE0}" type="datetime1">
               <a:rPr lang="en-US" smtClean="0"/>
-              <a:t>10-Sep-25</a:t>
+              <a:t>23-Sep-25</a:t>
             </a:fld>
             <a:endParaRPr lang="en-US"/>
           </a:p>
@@ -3637,7 +3637,7 @@
           <a:p>
             <a:fld id="{DF8C06B4-9380-4A4D-AF49-A3596E17DAF5}" type="datetime1">
               <a:rPr lang="en-US" smtClean="0"/>
-              <a:t>10-Sep-25</a:t>
+              <a:t>23-Sep-25</a:t>
             </a:fld>
             <a:endParaRPr lang="en-US"/>
           </a:p>
@@ -3909,7 +3909,7 @@
           <a:p>
             <a:fld id="{EF7FDEF1-C582-4E22-9E77-D68326471F28}" type="datetime1">
               <a:rPr lang="en-US" smtClean="0"/>
-              <a:t>10-Sep-25</a:t>
+              <a:t>23-Sep-25</a:t>
             </a:fld>
             <a:endParaRPr lang="en-US"/>
           </a:p>
@@ -4155,7 +4155,7 @@
           <a:p>
             <a:fld id="{780A9602-A9A9-453F-AEF1-37B5837E02CD}" type="datetime1">
               <a:rPr lang="en-US" smtClean="0"/>
-              <a:t>10-Sep-25</a:t>
+              <a:t>23-Sep-25</a:t>
             </a:fld>
             <a:endParaRPr lang="en-US"/>
           </a:p>
@@ -5650,8 +5650,8 @@
         </p:nvSpPr>
         <p:spPr>
           <a:xfrm>
-            <a:off x="390094" y="1549693"/>
-            <a:ext cx="8940534" cy="4551952"/>
+            <a:off x="43965" y="1371768"/>
+            <a:ext cx="8940534" cy="5167505"/>
           </a:xfrm>
           <a:prstGeom prst="rect">
             <a:avLst/>
@@ -5667,7 +5667,7 @@
             <a:endParaRPr lang="en-US" sz="2000" dirty="0"/>
           </a:p>
           <a:p>
-            <a:pPr marL="285750" indent="-285750" algn="just">
+            <a:pPr marL="742950" lvl="1" indent="-285750" algn="just">
               <a:lnSpc>
                 <a:spcPct val="200000"/>
               </a:lnSpc>
@@ -5691,7 +5691,7 @@
             </a:endParaRPr>
           </a:p>
           <a:p>
-            <a:pPr marL="285750" indent="-285750" algn="just">
+            <a:pPr marL="742950" lvl="1" indent="-285750" algn="just">
               <a:lnSpc>
                 <a:spcPct val="200000"/>
               </a:lnSpc>
@@ -5715,7 +5715,7 @@
             </a:endParaRPr>
           </a:p>
           <a:p>
-            <a:pPr marL="285750" indent="-285750" algn="just">
+            <a:pPr marL="742950" lvl="1" indent="-285750" algn="just">
               <a:lnSpc>
                 <a:spcPct val="200000"/>
               </a:lnSpc>
@@ -5739,7 +5739,7 @@
             </a:endParaRPr>
           </a:p>
           <a:p>
-            <a:pPr marL="285750" indent="-285750" algn="just">
+            <a:pPr marL="742950" lvl="1" indent="-285750" algn="just">
               <a:lnSpc>
                 <a:spcPct val="200000"/>
               </a:lnSpc>
@@ -5762,7 +5762,7 @@
             </a:r>
           </a:p>
           <a:p>
-            <a:pPr marL="285750" indent="-285750" algn="just">
+            <a:pPr marL="742950" lvl="1" indent="-285750" algn="just">
               <a:lnSpc>
                 <a:spcPct val="200000"/>
               </a:lnSpc>
@@ -5783,7 +5783,30 @@
               </a:rPr>
               <a:t>The Helios</a:t>
             </a:r>
-            <a:endParaRPr lang="en-IN" sz="2000" b="1" dirty="0">
+          </a:p>
+          <a:p>
+            <a:pPr marL="742950" lvl="1" indent="-285750" algn="just">
+              <a:lnSpc>
+                <a:spcPct val="200000"/>
+              </a:lnSpc>
+              <a:buFont typeface="Arial" panose="020B0604020202020204" pitchFamily="34" charset="0"/>
+              <a:buChar char="•"/>
+            </a:pPr>
+            <a:r>
+              <a:rPr lang="en-US" sz="2000" b="1" dirty="0">
+                <a:latin typeface="Arial" panose="020B0604020202020204" pitchFamily="34" charset="0"/>
+                <a:cs typeface="Arial" panose="020B0604020202020204" pitchFamily="34" charset="0"/>
+              </a:rPr>
+              <a:t>Team ID : </a:t>
+            </a:r>
+            <a:r>
+              <a:rPr lang="en-US" sz="2000" dirty="0">
+                <a:latin typeface="Arial" panose="020B0604020202020204" pitchFamily="34" charset="0"/>
+                <a:cs typeface="Arial" panose="020B0604020202020204" pitchFamily="34" charset="0"/>
+              </a:rPr>
+              <a:t>54318</a:t>
+            </a:r>
+            <a:endParaRPr lang="en-IN" sz="2000" dirty="0">
               <a:latin typeface="Arial" panose="020B0604020202020204" pitchFamily="34" charset="0"/>
               <a:cs typeface="Arial" panose="020B0604020202020204" pitchFamily="34" charset="0"/>
             </a:endParaRPr>
@@ -6498,7 +6521,7 @@
         </p:blipFill>
         <p:spPr>
           <a:xfrm>
-            <a:off x="5840205" y="1676399"/>
+            <a:off x="5964047" y="1675980"/>
             <a:ext cx="5894594" cy="4526245"/>
           </a:xfrm>
           <a:prstGeom prst="rect">
@@ -9737,8 +9760,8 @@
         </p:nvSpPr>
         <p:spPr bwMode="auto">
           <a:xfrm>
-            <a:off x="367529" y="1065769"/>
-            <a:ext cx="11301155" cy="5120889"/>
+            <a:off x="367529" y="2219899"/>
+            <a:ext cx="11301155" cy="2812629"/>
           </a:xfrm>
           <a:prstGeom prst="rect">
             <a:avLst/>
@@ -9893,94 +9916,18 @@
               <a:t>• </a:t>
             </a:r>
             <a:r>
-              <a:rPr lang="en-IN" sz="2000" b="1" dirty="0"/>
-              <a:t>Ahmedabad </a:t>
-            </a:r>
-            <a:r>
-              <a:rPr lang="en-IN" sz="2000" b="1" dirty="0" err="1"/>
-              <a:t>Janmarg</a:t>
-            </a:r>
-            <a:r>
-              <a:rPr lang="en-IN" sz="2000" b="1" dirty="0"/>
-              <a:t> (BRTS)</a:t>
+              <a:rPr lang="en-US" sz="2000" b="1" dirty="0"/>
+              <a:t>Local Transit data of tier 2-3 cities with prototype : </a:t>
             </a:r>
             <a:r>
               <a:rPr lang="en-IN" sz="2000" dirty="0"/>
-              <a:t> → Official portal for real-time tracking, route information, and services.</a:t>
-            </a:r>
-            <a:br>
-              <a:rPr lang="en-IN" sz="2000" dirty="0"/>
-            </a:br>
-            <a:r>
-              <a:rPr lang="en-IN" sz="2000" dirty="0"/>
-              <a:t>🔗 </a:t>
+              <a:t>🔗</a:t>
             </a:r>
             <a:r>
               <a:rPr lang="en-IN" sz="2000" dirty="0">
                 <a:hlinkClick r:id="rId5"/>
               </a:rPr>
-              <a:t>BRTS</a:t>
-            </a:r>
-            <a:br>
-              <a:rPr lang="en-IN" sz="2000" dirty="0"/>
-            </a:br>
-            <a:r>
-              <a:rPr lang="en-IN" sz="2000" dirty="0"/>
-              <a:t>• </a:t>
-            </a:r>
-            <a:r>
-              <a:rPr lang="en-IN" sz="2000" b="1" dirty="0"/>
-              <a:t>AMTS (Ahmedabad Municipal Transport Service)</a:t>
-            </a:r>
-            <a:r>
-              <a:rPr lang="en-IN" sz="2000" dirty="0"/>
-              <a:t> → Official site for schedules and city bus information.</a:t>
-            </a:r>
-            <a:br>
-              <a:rPr lang="en-IN" sz="2000" dirty="0"/>
-            </a:br>
-            <a:r>
-              <a:rPr lang="en-IN" sz="2000" dirty="0"/>
-              <a:t>🔗 </a:t>
-            </a:r>
-            <a:r>
-              <a:rPr lang="en-IN" sz="2000" dirty="0">
-                <a:hlinkClick r:id="rId6"/>
-              </a:rPr>
-              <a:t>AMTS</a:t>
-            </a:r>
-            <a:endParaRPr lang="en-IN" sz="2000" dirty="0"/>
-          </a:p>
-          <a:p>
-            <a:pPr defTabSz="914400" eaLnBrk="0" hangingPunct="0">
-              <a:lnSpc>
-                <a:spcPct val="150000"/>
-              </a:lnSpc>
-            </a:pPr>
-            <a:r>
-              <a:rPr lang="en-US" sz="2000" dirty="0"/>
-              <a:t>• </a:t>
-            </a:r>
-            <a:r>
-              <a:rPr lang="en-US" sz="2000" b="1" dirty="0"/>
-              <a:t>Ahmedabad Metro (GMRC)</a:t>
-            </a:r>
-            <a:r>
-              <a:rPr lang="en-US" sz="2000" dirty="0"/>
-              <a:t> → Official PDF with detailed metro route information, stations, and timings.</a:t>
-            </a:r>
-            <a:br>
-              <a:rPr lang="en-US" sz="2000" dirty="0"/>
-            </a:br>
-            <a:r>
-              <a:rPr lang="en-US" sz="2000" dirty="0"/>
-              <a:t>🔗 </a:t>
-            </a:r>
-            <a:r>
-              <a:rPr lang="en-US" sz="2000" dirty="0">
-                <a:hlinkClick r:id="rId7"/>
-              </a:rPr>
-              <a:t>GMRC</a:t>
+              <a:t>Github</a:t>
             </a:r>
             <a:endParaRPr lang="en-US" altLang="en-US" sz="2000" dirty="0">
               <a:latin typeface="Arial" panose="020B0604020202020204" pitchFamily="34" charset="0"/>
@@ -10376,7 +10323,7 @@
           <p:nvPr/>
         </p:nvPicPr>
         <p:blipFill>
-          <a:blip r:embed="rId8">
+          <a:blip r:embed="rId6">
             <a:extLst>
               <a:ext uri="{28A0092B-C50C-407E-A947-70E740481C1C}">
                 <a14:useLocalDpi xmlns:a14="http://schemas.microsoft.com/office/drawing/2010/main" val="0"/>

</xml_diff>